<commit_message>
Updated Robot Design Lessons
</commit_message>
<xml_diff>
--- a/translations/en-us/RobotGame/AligningOnLines.pptx
+++ b/translations/en-us/RobotGame/AligningOnLines.pptx
@@ -223,7 +223,7 @@
           <a:p>
             <a:fld id="{E354B44E-40A3-0E46-B16A-9BF1250A248B}" type="datetimeFigureOut">
               <a:rPr lang="en-US" smtClean="0"/>
-              <a:t>8/26/18</a:t>
+              <a:t>10/27/22</a:t>
             </a:fld>
             <a:endParaRPr lang="en-US"/>
           </a:p>
@@ -389,7 +389,7 @@
           <a:p>
             <a:fld id="{C86AD16C-2DB4-6642-BAD4-9ED973A087A0}" type="datetimeFigureOut">
               <a:rPr lang="en-US" smtClean="0"/>
-              <a:t>8/26/18</a:t>
+              <a:t>10/27/22</a:t>
             </a:fld>
             <a:endParaRPr lang="en-US"/>
           </a:p>
@@ -1102,7 +1102,7 @@
           <a:p>
             <a:fld id="{7407431C-7AA3-BA4F-9955-41E3F765721F}" type="datetime1">
               <a:rPr lang="en-US" smtClean="0"/>
-              <a:t>9/2/18</a:t>
+              <a:t>10/27/22</a:t>
             </a:fld>
             <a:endParaRPr lang="en-US"/>
           </a:p>
@@ -1698,7 +1698,7 @@
           <a:p>
             <a:fld id="{B2DF10CD-1AF1-104E-9EED-BD0135C10D68}" type="datetime1">
               <a:rPr lang="en-US" smtClean="0"/>
-              <a:t>9/2/18</a:t>
+              <a:t>10/27/22</a:t>
             </a:fld>
             <a:endParaRPr lang="en-US"/>
           </a:p>
@@ -1879,7 +1879,7 @@
           <a:p>
             <a:fld id="{59C51B1D-E3FA-BC44-82BF-92EE2F6F3080}" type="datetime1">
               <a:rPr lang="en-US" smtClean="0"/>
-              <a:t>9/2/18</a:t>
+              <a:t>10/27/22</a:t>
             </a:fld>
             <a:endParaRPr lang="en-US"/>
           </a:p>
@@ -2095,7 +2095,7 @@
           <a:p>
             <a:fld id="{786E84FA-792E-A245-AC9D-BF0F089305B4}" type="datetime1">
               <a:rPr lang="en-US" smtClean="0"/>
-              <a:t>9/2/18</a:t>
+              <a:t>10/27/22</a:t>
             </a:fld>
             <a:endParaRPr lang="en-US"/>
           </a:p>
@@ -2313,7 +2313,7 @@
           <a:noFill/>
           <a:extLst>
             <a:ext uri="{909E8E84-426E-40dd-AFC4-6F175D3DCCD1}">
-              <a14:hiddenFill xmlns:a14="http://schemas.microsoft.com/office/drawing/2010/main" xmlns="">
+              <a14:hiddenFill xmlns="" xmlns:a14="http://schemas.microsoft.com/office/drawing/2010/main">
                 <a:solidFill>
                   <a:srgbClr val="FFFFFF"/>
                 </a:solidFill>
@@ -2939,7 +2939,7 @@
           <a:p>
             <a:fld id="{B04A7B90-21AE-B14E-9702-028F33E34F58}" type="datetime1">
               <a:rPr lang="en-US" smtClean="0"/>
-              <a:t>9/2/18</a:t>
+              <a:t>10/27/22</a:t>
             </a:fld>
             <a:endParaRPr lang="en-US"/>
           </a:p>
@@ -3204,7 +3204,7 @@
           <a:p>
             <a:fld id="{C873B9DF-6262-D646-A097-E01F2C6087E1}" type="datetime1">
               <a:rPr lang="en-US" smtClean="0"/>
-              <a:t>9/2/18</a:t>
+              <a:t>10/27/22</a:t>
             </a:fld>
             <a:endParaRPr lang="en-US"/>
           </a:p>
@@ -3507,7 +3507,7 @@
           <a:p>
             <a:fld id="{1860D043-71AD-8D41-9E9E-695817E9673F}" type="datetime1">
               <a:rPr lang="en-US" smtClean="0"/>
-              <a:t>9/2/18</a:t>
+              <a:t>10/27/22</a:t>
             </a:fld>
             <a:endParaRPr lang="en-US"/>
           </a:p>
@@ -3961,7 +3961,7 @@
           <a:p>
             <a:fld id="{A6AF0BEB-8239-4645-BC5E-C64824903550}" type="datetime1">
               <a:rPr lang="en-US" smtClean="0"/>
-              <a:t>9/2/18</a:t>
+              <a:t>10/27/22</a:t>
             </a:fld>
             <a:endParaRPr lang="en-US"/>
           </a:p>
@@ -4089,7 +4089,7 @@
           <a:p>
             <a:fld id="{16A6B502-D0AE-2C4E-9A89-E26AA404D473}" type="datetime1">
               <a:rPr lang="en-US" smtClean="0"/>
-              <a:t>9/2/18</a:t>
+              <a:t>10/27/22</a:t>
             </a:fld>
             <a:endParaRPr lang="en-US"/>
           </a:p>
@@ -4195,7 +4195,7 @@
           <a:p>
             <a:fld id="{153162EA-326B-4047-95C5-E225D426827E}" type="datetime1">
               <a:rPr lang="en-US" smtClean="0"/>
-              <a:t>9/2/18</a:t>
+              <a:t>10/27/22</a:t>
             </a:fld>
             <a:endParaRPr lang="en-US"/>
           </a:p>
@@ -4453,7 +4453,7 @@
           <a:p>
             <a:fld id="{27A8D1BD-2D22-5249-9999-BB6CD7E6E59E}" type="datetime1">
               <a:rPr lang="en-US" smtClean="0"/>
-              <a:t>9/2/18</a:t>
+              <a:t>10/27/22</a:t>
             </a:fld>
             <a:endParaRPr lang="en-US"/>
           </a:p>
@@ -4665,7 +4665,7 @@
           <a:p>
             <a:fld id="{4388DCA7-4F1D-B841-893C-1742E22A9C33}" type="datetime1">
               <a:rPr lang="en-US" smtClean="0"/>
-              <a:t>9/2/18</a:t>
+              <a:t>10/27/22</a:t>
             </a:fld>
             <a:endParaRPr lang="en-US"/>
           </a:p>
@@ -4948,7 +4948,7 @@
           <a:p>
             <a:fld id="{AC6B8149-BE11-4749-AF98-849FAC576E7C}" type="datetime1">
               <a:rPr lang="en-US" smtClean="0"/>
-              <a:t>9/2/18</a:t>
+              <a:t>10/27/22</a:t>
             </a:fld>
             <a:endParaRPr lang="en-US"/>
           </a:p>
@@ -5215,7 +5215,7 @@
           <a:p>
             <a:fld id="{44C805FF-F4D0-C34B-BD16-2635FFA98EB1}" type="datetime1">
               <a:rPr lang="en-US" smtClean="0"/>
-              <a:t>9/2/18</a:t>
+              <a:t>10/27/22</a:t>
             </a:fld>
             <a:endParaRPr lang="en-US"/>
           </a:p>
@@ -5404,7 +5404,7 @@
           <a:p>
             <a:fld id="{6CE5A749-B28D-6C4E-80BE-12D3D584E2A4}" type="datetime1">
               <a:rPr lang="en-US" smtClean="0"/>
-              <a:t>9/2/18</a:t>
+              <a:t>10/27/22</a:t>
             </a:fld>
             <a:endParaRPr lang="en-US"/>
           </a:p>
@@ -5605,7 +5605,7 @@
           <a:p>
             <a:fld id="{6CE8609D-602D-2C45-853B-DFE76DA949AB}" type="datetime1">
               <a:rPr lang="en-US" smtClean="0"/>
-              <a:t>9/2/18</a:t>
+              <a:t>10/27/22</a:t>
             </a:fld>
             <a:endParaRPr lang="en-US"/>
           </a:p>
@@ -5776,7 +5776,7 @@
           <a:p>
             <a:fld id="{74199A5C-58D7-104C-BCA3-24AAF705B4D7}" type="datetime1">
               <a:rPr lang="en-US" smtClean="0"/>
-              <a:t>9/2/18</a:t>
+              <a:t>10/27/22</a:t>
             </a:fld>
             <a:endParaRPr lang="en-US"/>
           </a:p>
@@ -6024,7 +6024,7 @@
           <a:p>
             <a:fld id="{947BE9C8-4C8B-D944-B706-53E2EB82B02D}" type="datetime1">
               <a:rPr lang="en-US" smtClean="0"/>
-              <a:t>9/2/18</a:t>
+              <a:t>10/27/22</a:t>
             </a:fld>
             <a:endParaRPr lang="en-US"/>
           </a:p>
@@ -6256,7 +6256,7 @@
           <a:p>
             <a:fld id="{CC13E8CD-0554-F043-AD00-9EC7FE765F73}" type="datetime1">
               <a:rPr lang="en-US" smtClean="0"/>
-              <a:t>9/2/18</a:t>
+              <a:t>10/27/22</a:t>
             </a:fld>
             <a:endParaRPr lang="en-US"/>
           </a:p>
@@ -6623,7 +6623,7 @@
           <a:p>
             <a:fld id="{0A8427F6-BB93-F342-8547-803D3B7117A1}" type="datetime1">
               <a:rPr lang="en-US" smtClean="0"/>
-              <a:t>9/2/18</a:t>
+              <a:t>10/27/22</a:t>
             </a:fld>
             <a:endParaRPr lang="en-US"/>
           </a:p>
@@ -6743,7 +6743,7 @@
           <a:p>
             <a:fld id="{55A2AF00-224C-1B46-B566-049822673348}" type="datetime1">
               <a:rPr lang="en-US" smtClean="0"/>
-              <a:t>9/2/18</a:t>
+              <a:t>10/27/22</a:t>
             </a:fld>
             <a:endParaRPr lang="en-US"/>
           </a:p>
@@ -6841,7 +6841,7 @@
           <a:p>
             <a:fld id="{4EECCBCB-25EA-1A44-A063-2E6DEBBFB553}" type="datetime1">
               <a:rPr lang="en-US" smtClean="0"/>
-              <a:t>9/2/18</a:t>
+              <a:t>10/27/22</a:t>
             </a:fld>
             <a:endParaRPr lang="en-US"/>
           </a:p>
@@ -7098,7 +7098,7 @@
           <a:p>
             <a:fld id="{48B7359E-B971-4F47-93F6-86869520D41C}" type="datetime1">
               <a:rPr lang="en-US" smtClean="0"/>
-              <a:t>9/2/18</a:t>
+              <a:t>10/27/22</a:t>
             </a:fld>
             <a:endParaRPr lang="en-US"/>
           </a:p>
@@ -7376,7 +7376,7 @@
           <a:p>
             <a:fld id="{A84C2888-E2B7-D641-ACAB-70DF8CCF6DFB}" type="datetime1">
               <a:rPr lang="en-US" smtClean="0"/>
-              <a:t>9/2/18</a:t>
+              <a:t>10/27/22</a:t>
             </a:fld>
             <a:endParaRPr lang="en-US"/>
           </a:p>
@@ -7634,7 +7634,7 @@
           <a:p>
             <a:fld id="{48067D2B-56A9-3548-BA78-0F7D21B7B168}" type="datetime1">
               <a:rPr lang="en-US" smtClean="0"/>
-              <a:t>9/2/18</a:t>
+              <a:t>10/27/22</a:t>
             </a:fld>
             <a:endParaRPr lang="en-US"/>
           </a:p>
@@ -7805,7 +7805,7 @@
           <a:p>
             <a:fld id="{BE9835D7-07D2-5844-A108-BCE86D49F7B1}" type="datetime1">
               <a:rPr lang="en-US" smtClean="0"/>
-              <a:t>9/2/18</a:t>
+              <a:t>10/27/22</a:t>
             </a:fld>
             <a:endParaRPr lang="en-US"/>
           </a:p>
@@ -7986,7 +7986,7 @@
           <a:p>
             <a:fld id="{490B0215-9339-C649-8EF3-8DAA7842C375}" type="datetime1">
               <a:rPr lang="en-US" smtClean="0"/>
-              <a:t>9/2/18</a:t>
+              <a:t>10/27/22</a:t>
             </a:fld>
             <a:endParaRPr lang="en-US"/>
           </a:p>
@@ -8243,7 +8243,7 @@
           <a:p>
             <a:fld id="{3493C6D4-C051-314A-8EC8-1AC028A1C0B2}" type="datetime1">
               <a:rPr lang="en-US" smtClean="0"/>
-              <a:t>9/2/18</a:t>
+              <a:t>10/27/22</a:t>
             </a:fld>
             <a:endParaRPr lang="en-US"/>
           </a:p>
@@ -9267,7 +9267,7 @@
           <a:p>
             <a:fld id="{0C723005-6B22-1C45-9FCB-9D672DCE9757}" type="datetime1">
               <a:rPr lang="en-US" smtClean="0"/>
-              <a:t>9/2/18</a:t>
+              <a:t>10/27/22</a:t>
             </a:fld>
             <a:endParaRPr lang="en-US"/>
           </a:p>
@@ -9529,7 +9529,7 @@
           <a:p>
             <a:fld id="{DBAB3D4C-8EA3-1240-9199-77C441E3DB6A}" type="datetime1">
               <a:rPr lang="en-US" smtClean="0"/>
-              <a:t>9/2/18</a:t>
+              <a:t>10/27/22</a:t>
             </a:fld>
             <a:endParaRPr lang="en-US"/>
           </a:p>
@@ -9824,7 +9824,7 @@
           <a:p>
             <a:fld id="{88DBFD65-2015-374A-8CEB-84B169061D79}" type="datetime1">
               <a:rPr lang="en-US" smtClean="0"/>
-              <a:t>9/2/18</a:t>
+              <a:t>10/27/22</a:t>
             </a:fld>
             <a:endParaRPr lang="en-US"/>
           </a:p>
@@ -10270,7 +10270,7 @@
           <a:p>
             <a:fld id="{92063A14-6ACE-9E4F-8ACE-D6FEAAFA6E1A}" type="datetime1">
               <a:rPr lang="en-US" smtClean="0"/>
-              <a:t>9/2/18</a:t>
+              <a:t>10/27/22</a:t>
             </a:fld>
             <a:endParaRPr lang="en-US"/>
           </a:p>
@@ -10390,7 +10390,7 @@
           <a:p>
             <a:fld id="{64CA2518-3620-D044-AECA-57030958B0EE}" type="datetime1">
               <a:rPr lang="en-US" smtClean="0"/>
-              <a:t>9/2/18</a:t>
+              <a:t>10/27/22</a:t>
             </a:fld>
             <a:endParaRPr lang="en-US"/>
           </a:p>
@@ -10684,7 +10684,7 @@
           <a:p>
             <a:fld id="{A4C4B1FB-D790-2444-AFBA-C25C5EFB023F}" type="datetime1">
               <a:rPr lang="en-US" smtClean="0"/>
-              <a:t>9/2/18</a:t>
+              <a:t>10/27/22</a:t>
             </a:fld>
             <a:endParaRPr lang="en-US"/>
           </a:p>
@@ -10782,7 +10782,7 @@
           <a:p>
             <a:fld id="{FA568A6E-70C3-5F43-A729-B2AF0EC95F95}" type="datetime1">
               <a:rPr lang="en-US" smtClean="0"/>
-              <a:t>9/2/18</a:t>
+              <a:t>10/27/22</a:t>
             </a:fld>
             <a:endParaRPr lang="en-US"/>
           </a:p>
@@ -11032,7 +11032,7 @@
           <a:p>
             <a:fld id="{0EDC0C94-716B-0249-B0B5-1CFC81D98C3D}" type="datetime1">
               <a:rPr lang="en-US" smtClean="0"/>
-              <a:t>9/2/18</a:t>
+              <a:t>10/27/22</a:t>
             </a:fld>
             <a:endParaRPr lang="en-US"/>
           </a:p>
@@ -11332,7 +11332,7 @@
           <a:p>
             <a:fld id="{8F07386C-5AF6-C24D-9257-EAEF0E43E9BA}" type="datetime1">
               <a:rPr lang="en-US" smtClean="0"/>
-              <a:t>9/2/18</a:t>
+              <a:t>10/27/22</a:t>
             </a:fld>
             <a:endParaRPr lang="en-US"/>
           </a:p>
@@ -11591,7 +11591,7 @@
           <a:p>
             <a:fld id="{3DC0D2AC-541F-CE48-9140-25F6AE3FD6F7}" type="datetime1">
               <a:rPr lang="en-US" smtClean="0"/>
-              <a:t>9/2/18</a:t>
+              <a:t>10/27/22</a:t>
             </a:fld>
             <a:endParaRPr lang="en-US"/>
           </a:p>
@@ -11772,7 +11772,7 @@
           <a:p>
             <a:fld id="{FD8BCF7A-9596-B84E-9C6D-FB31FBAB0F9E}" type="datetime1">
               <a:rPr lang="en-US" smtClean="0"/>
-              <a:t>9/2/18</a:t>
+              <a:t>10/27/22</a:t>
             </a:fld>
             <a:endParaRPr lang="en-US"/>
           </a:p>
@@ -11988,7 +11988,7 @@
           <a:p>
             <a:fld id="{D9D77C44-59CC-974A-8997-B27E27FE9626}" type="datetime1">
               <a:rPr lang="en-US" smtClean="0"/>
-              <a:t>9/2/18</a:t>
+              <a:t>10/27/22</a:t>
             </a:fld>
             <a:endParaRPr lang="en-US"/>
           </a:p>
@@ -13244,7 +13244,7 @@
           <a:p>
             <a:fld id="{28ECFE6A-D09F-6B40-9AF0-569AB879C41A}" type="datetime1">
               <a:rPr lang="en-US" smtClean="0"/>
-              <a:t>9/2/18</a:t>
+              <a:t>10/27/22</a:t>
             </a:fld>
             <a:endParaRPr lang="en-US"/>
           </a:p>
@@ -13509,7 +13509,7 @@
           <a:p>
             <a:fld id="{2EE637DF-907F-4348-A56E-AF42BB893C2B}" type="datetime1">
               <a:rPr lang="en-US" smtClean="0"/>
-              <a:t>9/2/18</a:t>
+              <a:t>10/27/22</a:t>
             </a:fld>
             <a:endParaRPr lang="en-US"/>
           </a:p>
@@ -13812,7 +13812,7 @@
           <a:p>
             <a:fld id="{0B569DDC-2F63-B248-984E-1287141184FA}" type="datetime1">
               <a:rPr lang="en-US" smtClean="0"/>
-              <a:t>9/2/18</a:t>
+              <a:t>10/27/22</a:t>
             </a:fld>
             <a:endParaRPr lang="en-US"/>
           </a:p>
@@ -14266,7 +14266,7 @@
           <a:p>
             <a:fld id="{83998531-B30B-194A-8066-C10704CA87D4}" type="datetime1">
               <a:rPr lang="en-US" smtClean="0"/>
-              <a:t>9/2/18</a:t>
+              <a:t>10/27/22</a:t>
             </a:fld>
             <a:endParaRPr lang="en-US"/>
           </a:p>
@@ -14720,7 +14720,7 @@
           <a:p>
             <a:fld id="{EF1B46FC-AB90-E74E-BB4D-C387C89725E1}" type="datetime1">
               <a:rPr lang="en-US" smtClean="0"/>
-              <a:t>9/2/18</a:t>
+              <a:t>10/27/22</a:t>
             </a:fld>
             <a:endParaRPr lang="en-US"/>
           </a:p>
@@ -14840,7 +14840,7 @@
           <a:p>
             <a:fld id="{1F27B00F-3ADA-A343-857A-6A5E89F7B2DA}" type="datetime1">
               <a:rPr lang="en-US" smtClean="0"/>
-              <a:t>9/2/18</a:t>
+              <a:t>10/27/22</a:t>
             </a:fld>
             <a:endParaRPr lang="en-US"/>
           </a:p>
@@ -14946,7 +14946,7 @@
           <a:p>
             <a:fld id="{26474E33-04AA-CB45-947F-FBB2D2255C34}" type="datetime1">
               <a:rPr lang="en-US" smtClean="0"/>
-              <a:t>9/2/18</a:t>
+              <a:t>10/27/22</a:t>
             </a:fld>
             <a:endParaRPr lang="en-US"/>
           </a:p>
@@ -15204,7 +15204,7 @@
           <a:p>
             <a:fld id="{997F9677-8375-694C-88D9-F210978A017A}" type="datetime1">
               <a:rPr lang="en-US" smtClean="0"/>
-              <a:t>9/2/18</a:t>
+              <a:t>10/27/22</a:t>
             </a:fld>
             <a:endParaRPr lang="en-US"/>
           </a:p>
@@ -15512,7 +15512,7 @@
           <a:p>
             <a:fld id="{039079F3-8D91-AD4A-9FD0-5FD84FB8FB0B}" type="datetime1">
               <a:rPr lang="en-US" smtClean="0"/>
-              <a:t>9/2/18</a:t>
+              <a:t>10/27/22</a:t>
             </a:fld>
             <a:endParaRPr lang="en-US"/>
           </a:p>
@@ -15779,7 +15779,7 @@
           <a:p>
             <a:fld id="{0D6F9699-B24F-DA49-9B09-913EBCEBC123}" type="datetime1">
               <a:rPr lang="en-US" smtClean="0"/>
-              <a:t>9/2/18</a:t>
+              <a:t>10/27/22</a:t>
             </a:fld>
             <a:endParaRPr lang="en-US"/>
           </a:p>
@@ -15968,7 +15968,7 @@
           <a:p>
             <a:fld id="{288E1671-850E-8F4B-B0D7-414D365C161D}" type="datetime1">
               <a:rPr lang="en-US" smtClean="0"/>
-              <a:t>9/2/18</a:t>
+              <a:t>10/27/22</a:t>
             </a:fld>
             <a:endParaRPr lang="en-US"/>
           </a:p>
@@ -16169,7 +16169,7 @@
           <a:p>
             <a:fld id="{B1AEDFBF-8690-FC46-8C92-AACC9C3D87A4}" type="datetime1">
               <a:rPr lang="en-US" smtClean="0"/>
-              <a:t>9/2/18</a:t>
+              <a:t>10/27/22</a:t>
             </a:fld>
             <a:endParaRPr lang="en-US"/>
           </a:p>
@@ -16340,7 +16340,7 @@
           <a:p>
             <a:fld id="{411B46AB-1CBE-724E-88E3-060D5D90CA43}" type="datetime1">
               <a:rPr lang="en-US" smtClean="0"/>
-              <a:t>9/2/18</a:t>
+              <a:t>10/27/22</a:t>
             </a:fld>
             <a:endParaRPr lang="en-US"/>
           </a:p>
@@ -16588,7 +16588,7 @@
           <a:p>
             <a:fld id="{DF00341E-31DC-444D-A982-BD9076AA2C2E}" type="datetime1">
               <a:rPr lang="en-US" smtClean="0"/>
-              <a:t>9/2/18</a:t>
+              <a:t>10/27/22</a:t>
             </a:fld>
             <a:endParaRPr lang="en-US"/>
           </a:p>
@@ -16820,7 +16820,7 @@
           <a:p>
             <a:fld id="{7F9E01E0-7EA1-954E-A7CD-FC66CD2DFC0D}" type="datetime1">
               <a:rPr lang="en-US" smtClean="0"/>
-              <a:t>9/2/18</a:t>
+              <a:t>10/27/22</a:t>
             </a:fld>
             <a:endParaRPr lang="en-US"/>
           </a:p>
@@ -16940,7 +16940,7 @@
           <a:p>
             <a:fld id="{77C1455B-BEF5-FF42-A996-809D61C0F53A}" type="datetime1">
               <a:rPr lang="en-US" smtClean="0"/>
-              <a:t>9/2/18</a:t>
+              <a:t>10/27/22</a:t>
             </a:fld>
             <a:endParaRPr lang="en-US"/>
           </a:p>
@@ -17307,7 +17307,7 @@
           <a:p>
             <a:fld id="{A8254411-7E37-2E40-BEB7-55B2F7BB4E81}" type="datetime1">
               <a:rPr lang="en-US" smtClean="0"/>
-              <a:t>9/2/18</a:t>
+              <a:t>10/27/22</a:t>
             </a:fld>
             <a:endParaRPr lang="en-US"/>
           </a:p>
@@ -17427,7 +17427,7 @@
           <a:p>
             <a:fld id="{653F2B09-8A89-3B4D-969D-BE5621ECB75B}" type="datetime1">
               <a:rPr lang="en-US" smtClean="0"/>
-              <a:t>9/2/18</a:t>
+              <a:t>10/27/22</a:t>
             </a:fld>
             <a:endParaRPr lang="en-US"/>
           </a:p>
@@ -17525,7 +17525,7 @@
           <a:p>
             <a:fld id="{F30492AC-33C8-CC42-8A71-9EAC2E3E8B47}" type="datetime1">
               <a:rPr lang="en-US" smtClean="0"/>
-              <a:t>9/2/18</a:t>
+              <a:t>10/27/22</a:t>
             </a:fld>
             <a:endParaRPr lang="en-US"/>
           </a:p>
@@ -17803,7 +17803,7 @@
           <a:p>
             <a:fld id="{B71CF886-0E05-2145-9C51-D8EA291F307E}" type="datetime1">
               <a:rPr lang="en-US" smtClean="0"/>
-              <a:t>9/2/18</a:t>
+              <a:t>10/27/22</a:t>
             </a:fld>
             <a:endParaRPr lang="en-US"/>
           </a:p>
@@ -18061,7 +18061,7 @@
           <a:p>
             <a:fld id="{D4F6D8BF-4C51-6047-A346-1B1816FE7CEE}" type="datetime1">
               <a:rPr lang="en-US" smtClean="0"/>
-              <a:t>9/2/18</a:t>
+              <a:t>10/27/22</a:t>
             </a:fld>
             <a:endParaRPr lang="en-US"/>
           </a:p>
@@ -18232,7 +18232,7 @@
           <a:p>
             <a:fld id="{749D5ED2-EEF1-2A48-891C-5BCC8F9D9B4D}" type="datetime1">
               <a:rPr lang="en-US" smtClean="0"/>
-              <a:t>9/2/18</a:t>
+              <a:t>10/27/22</a:t>
             </a:fld>
             <a:endParaRPr lang="en-US"/>
           </a:p>
@@ -18413,7 +18413,7 @@
           <a:p>
             <a:fld id="{C4CFCBA2-5035-CB47-8C65-A7D2DBF9D9C5}" type="datetime1">
               <a:rPr lang="en-US" smtClean="0"/>
-              <a:t>9/2/18</a:t>
+              <a:t>10/27/22</a:t>
             </a:fld>
             <a:endParaRPr lang="en-US"/>
           </a:p>
@@ -18730,7 +18730,7 @@
           <a:p>
             <a:fld id="{E3E27A96-C989-EA40-B306-5457DD31362D}" type="datetime1">
               <a:rPr lang="en-US" smtClean="0"/>
-              <a:t>9/2/18</a:t>
+              <a:t>10/27/22</a:t>
             </a:fld>
             <a:endParaRPr lang="en-US"/>
           </a:p>
@@ -19063,7 +19063,7 @@
           <a:p>
             <a:fld id="{CDFBC13A-9F5D-4F44-B27B-5B30AD13148B}" type="datetime1">
               <a:rPr lang="en-US" smtClean="0"/>
-              <a:t>9/2/18</a:t>
+              <a:t>10/27/22</a:t>
             </a:fld>
             <a:endParaRPr lang="en-US"/>
           </a:p>
@@ -19515,7 +19515,7 @@
             <a:fld id="{B61BEF0D-F0BB-DE4B-95CE-6DB70DBA9567}" type="datetimeFigureOut">
               <a:rPr lang="en-US" smtClean="0"/>
               <a:pPr/>
-              <a:t>8/26/18</a:t>
+              <a:t>10/27/22</a:t>
             </a:fld>
             <a:endParaRPr lang="en-US" dirty="0"/>
           </a:p>
@@ -19833,7 +19833,7 @@
           <a:p>
             <a:fld id="{9C24EE85-F29C-1C44-85F0-ACCB45C7F720}" type="datetime1">
               <a:rPr lang="en-US" smtClean="0"/>
-              <a:t>9/2/18</a:t>
+              <a:t>10/27/22</a:t>
             </a:fld>
             <a:endParaRPr lang="en-US"/>
           </a:p>
@@ -20119,7 +20119,7 @@
           <a:p>
             <a:fld id="{17DFCF89-78C7-1741-A246-8D84A0A25EB1}" type="datetime1">
               <a:rPr lang="en-US" smtClean="0"/>
-              <a:t>9/2/18</a:t>
+              <a:t>10/27/22</a:t>
             </a:fld>
             <a:endParaRPr lang="en-US"/>
           </a:p>
@@ -20567,7 +20567,7 @@
           <a:p>
             <a:fld id="{0F01E2B2-0E81-E840-99DD-88E365E7B2D8}" type="datetime1">
               <a:rPr lang="en-US" smtClean="0"/>
-              <a:t>9/2/18</a:t>
+              <a:t>10/27/22</a:t>
             </a:fld>
             <a:endParaRPr lang="en-US"/>
           </a:p>
@@ -20751,7 +20751,7 @@
           <a:p>
             <a:fld id="{54EE1083-6A27-524A-B43A-2A881E3690DD}" type="datetime1">
               <a:rPr lang="en-US" smtClean="0"/>
-              <a:t>9/2/18</a:t>
+              <a:t>10/27/22</a:t>
             </a:fld>
             <a:endParaRPr lang="en-US"/>
           </a:p>
@@ -20873,7 +20873,7 @@
           <a:p>
             <a:fld id="{DD47C94B-C1D6-6B4A-BFF7-BD1C80F7A696}" type="datetime1">
               <a:rPr lang="en-US" smtClean="0"/>
-              <a:t>9/2/18</a:t>
+              <a:t>10/27/22</a:t>
             </a:fld>
             <a:endParaRPr lang="en-US"/>
           </a:p>
@@ -21278,7 +21278,7 @@
           <a:p>
             <a:fld id="{DE71D4EE-C94F-ED46-96D7-FCB9222301EB}" type="datetime1">
               <a:rPr lang="en-US" smtClean="0"/>
-              <a:t>9/2/18</a:t>
+              <a:t>10/27/22</a:t>
             </a:fld>
             <a:endParaRPr lang="en-US"/>
           </a:p>
@@ -21594,7 +21594,7 @@
           <a:p>
             <a:fld id="{74E03572-791D-1A41-8D6F-26ACA3F7E7E0}" type="datetime1">
               <a:rPr lang="en-US" smtClean="0"/>
-              <a:t>9/2/18</a:t>
+              <a:t>10/27/22</a:t>
             </a:fld>
             <a:endParaRPr lang="en-US"/>
           </a:p>
@@ -21846,7 +21846,7 @@
           <a:p>
             <a:fld id="{D6A2BA99-446A-6843-9679-6C2ED0299CA1}" type="datetime1">
               <a:rPr lang="en-US" smtClean="0"/>
-              <a:t>9/2/18</a:t>
+              <a:t>10/27/22</a:t>
             </a:fld>
             <a:endParaRPr lang="en-US"/>
           </a:p>
@@ -22103,7 +22103,7 @@
           <a:p>
             <a:fld id="{78EEF861-8136-164A-A36C-6CF3D93A4058}" type="datetime1">
               <a:rPr lang="en-US" smtClean="0"/>
-              <a:t>9/2/18</a:t>
+              <a:t>10/27/22</a:t>
             </a:fld>
             <a:endParaRPr lang="en-US"/>
           </a:p>
@@ -22380,7 +22380,7 @@
           <a:p>
             <a:fld id="{CA636E37-C277-D94B-B7E6-7CCF14989C61}" type="datetime1">
               <a:rPr lang="en-US" smtClean="0"/>
-              <a:t>9/2/18</a:t>
+              <a:t>10/27/22</a:t>
             </a:fld>
             <a:endParaRPr lang="en-US"/>
           </a:p>
@@ -22680,7 +22680,7 @@
           <a:p>
             <a:fld id="{5DCD7DF2-A1F1-9244-B93F-ED7F90402CFF}" type="datetime1">
               <a:rPr lang="en-US" smtClean="0"/>
-              <a:t>9/2/18</a:t>
+              <a:t>10/27/22</a:t>
             </a:fld>
             <a:endParaRPr lang="en-US"/>
           </a:p>
@@ -22981,7 +22981,7 @@
           <a:p>
             <a:fld id="{AEAB2CE1-036B-6149-8BEE-0DE9BC29AA7A}" type="datetime1">
               <a:rPr lang="en-US" smtClean="0"/>
-              <a:t>9/2/18</a:t>
+              <a:t>10/27/22</a:t>
             </a:fld>
             <a:endParaRPr lang="en-US"/>
           </a:p>
@@ -23933,7 +23933,7 @@
           <a:p>
             <a:fld id="{217112FF-32FC-214B-8D4B-72E9083C926E}" type="datetime1">
               <a:rPr lang="en-US" smtClean="0"/>
-              <a:t>9/2/18</a:t>
+              <a:t>10/27/22</a:t>
             </a:fld>
             <a:endParaRPr lang="en-US"/>
           </a:p>
@@ -24991,7 +24991,7 @@
           <a:p>
             <a:fld id="{D490704F-79EA-B242-A561-D817748EC2F5}" type="datetime1">
               <a:rPr lang="en-US" smtClean="0"/>
-              <a:t>9/2/18</a:t>
+              <a:t>10/27/22</a:t>
             </a:fld>
             <a:endParaRPr lang="en-US"/>
           </a:p>
@@ -25533,7 +25533,7 @@
           <a:p>
             <a:fld id="{C10D0552-5D4F-A44B-8B38-5897EEBFCA52}" type="datetime1">
               <a:rPr lang="en-US" smtClean="0"/>
-              <a:t>9/2/18</a:t>
+              <a:t>10/27/22</a:t>
             </a:fld>
             <a:endParaRPr lang="en-US"/>
           </a:p>
@@ -26902,7 +26902,7 @@
           <a:p>
             <a:fld id="{67625A13-5BC2-9142-9A65-4F0F0BA387FC}" type="datetime1">
               <a:rPr lang="en-US" smtClean="0"/>
-              <a:t>9/2/18</a:t>
+              <a:t>10/27/22</a:t>
             </a:fld>
             <a:endParaRPr lang="en-US"/>
           </a:p>
@@ -27980,7 +27980,7 @@
           <a:p>
             <a:fld id="{BD72946B-4FF2-4E49-8540-2EC3D2226E01}" type="datetime1">
               <a:rPr lang="en-US" smtClean="0"/>
-              <a:t>9/2/18</a:t>
+              <a:t>10/27/22</a:t>
             </a:fld>
             <a:endParaRPr lang="en-US"/>
           </a:p>
@@ -28642,7 +28642,7 @@
           <a:p>
             <a:fld id="{4AF927B6-26D5-624F-9D2E-50699AF3378E}" type="datetime1">
               <a:rPr lang="en-US" smtClean="0"/>
-              <a:t>9/2/18</a:t>
+              <a:t>10/27/22</a:t>
             </a:fld>
             <a:endParaRPr lang="en-US"/>
           </a:p>
@@ -29238,329 +29238,126 @@
           <a:chExt cx="0" cy="0"/>
         </a:xfrm>
       </p:grpSpPr>
-      <p:grpSp>
-        <p:nvGrpSpPr>
-          <p:cNvPr id="6" name="Group 5">
+      <p:pic>
+        <p:nvPicPr>
+          <p:cNvPr id="12" name="Picture 11" descr="A picture containing map&#10;&#10;Description automatically generated">
             <a:extLst>
               <a:ext uri="{FF2B5EF4-FFF2-40B4-BE49-F238E27FC236}">
-                <a16:creationId xmlns:a16="http://schemas.microsoft.com/office/drawing/2014/main" id="{43427906-C74B-9545-B180-6CC064D2AE85}"/>
+                <a16:creationId xmlns:a16="http://schemas.microsoft.com/office/drawing/2014/main" id="{4E687E70-32E6-75BB-7DF2-947C699CDC4B}"/>
               </a:ext>
             </a:extLst>
           </p:cNvPr>
-          <p:cNvGrpSpPr/>
+          <p:cNvPicPr>
+            <a:picLocks noChangeAspect="1"/>
+          </p:cNvPicPr>
           <p:nvPr/>
-        </p:nvGrpSpPr>
-        <p:grpSpPr>
+        </p:nvPicPr>
+        <p:blipFill>
+          <a:blip r:embed="rId2">
+            <a:extLst>
+              <a:ext uri="{28A0092B-C50C-407E-A947-70E740481C1C}">
+                <a14:useLocalDpi xmlns:a14="http://schemas.microsoft.com/office/drawing/2010/main" val="0"/>
+              </a:ext>
+            </a:extLst>
+          </a:blip>
+          <a:stretch>
+            <a:fillRect/>
+          </a:stretch>
+        </p:blipFill>
+        <p:spPr>
           <a:xfrm>
-            <a:off x="3996173" y="3710907"/>
-            <a:ext cx="4806239" cy="2479303"/>
-            <a:chOff x="848141" y="2526181"/>
-            <a:chExt cx="7474224" cy="3855586"/>
+            <a:off x="4010024" y="3795880"/>
+            <a:ext cx="4685883" cy="2267491"/>
           </a:xfrm>
-        </p:grpSpPr>
-        <p:pic>
-          <p:nvPicPr>
-            <p:cNvPr id="7" name="Picture 6">
-              <a:extLst>
-                <a:ext uri="{FF2B5EF4-FFF2-40B4-BE49-F238E27FC236}">
-                  <a16:creationId xmlns:a16="http://schemas.microsoft.com/office/drawing/2014/main" id="{464FBE49-60BF-7E4D-84C2-329704DE305E}"/>
-                </a:ext>
-              </a:extLst>
-            </p:cNvPr>
-            <p:cNvPicPr>
-              <a:picLocks noChangeAspect="1"/>
-            </p:cNvPicPr>
-            <p:nvPr/>
-          </p:nvPicPr>
-          <p:blipFill>
-            <a:blip r:embed="rId2" cstate="screen">
-              <a:extLst>
-                <a:ext uri="{28A0092B-C50C-407E-A947-70E740481C1C}">
-                  <a14:useLocalDpi xmlns:a14="http://schemas.microsoft.com/office/drawing/2010/main"/>
-                </a:ext>
-              </a:extLst>
-            </a:blip>
-            <a:stretch>
-              <a:fillRect/>
-            </a:stretch>
-          </p:blipFill>
-          <p:spPr>
-            <a:xfrm>
-              <a:off x="848141" y="2526181"/>
-              <a:ext cx="7474224" cy="3624999"/>
-            </a:xfrm>
-            <a:prstGeom prst="rect">
-              <a:avLst/>
-            </a:prstGeom>
-          </p:spPr>
-        </p:pic>
-        <p:sp>
-          <p:nvSpPr>
-            <p:cNvPr id="5" name="Oval 4">
-              <a:extLst>
-                <a:ext uri="{FF2B5EF4-FFF2-40B4-BE49-F238E27FC236}">
-                  <a16:creationId xmlns:a16="http://schemas.microsoft.com/office/drawing/2014/main" id="{3728BE5D-E362-B74E-B714-B653AF6F3157}"/>
-                </a:ext>
-              </a:extLst>
-            </p:cNvPr>
-            <p:cNvSpPr/>
-            <p:nvPr/>
-          </p:nvSpPr>
-          <p:spPr>
-            <a:xfrm>
-              <a:off x="5642868" y="3800061"/>
-              <a:ext cx="738054" cy="622852"/>
-            </a:xfrm>
-            <a:prstGeom prst="ellipse">
-              <a:avLst/>
-            </a:prstGeom>
-            <a:noFill/>
-            <a:ln w="76200">
-              <a:solidFill>
-                <a:srgbClr val="FF3FFF"/>
-              </a:solidFill>
-            </a:ln>
-          </p:spPr>
-          <p:style>
-            <a:lnRef idx="2">
-              <a:schemeClr val="accent1">
-                <a:shade val="50000"/>
-              </a:schemeClr>
-            </a:lnRef>
-            <a:fillRef idx="1">
-              <a:schemeClr val="accent1"/>
-            </a:fillRef>
-            <a:effectRef idx="0">
-              <a:schemeClr val="accent1"/>
-            </a:effectRef>
-            <a:fontRef idx="minor">
-              <a:schemeClr val="lt1"/>
-            </a:fontRef>
-          </p:style>
-          <p:txBody>
-            <a:bodyPr rtlCol="0" anchor="ctr"/>
-            <a:lstStyle/>
-            <a:p>
-              <a:pPr algn="ctr"/>
-              <a:endParaRPr lang="en-US" sz="1600"/>
-            </a:p>
-          </p:txBody>
-        </p:sp>
-        <p:cxnSp>
-          <p:nvCxnSpPr>
-            <p:cNvPr id="9" name="Straight Arrow Connector 8">
-              <a:extLst>
-                <a:ext uri="{FF2B5EF4-FFF2-40B4-BE49-F238E27FC236}">
-                  <a16:creationId xmlns:a16="http://schemas.microsoft.com/office/drawing/2014/main" id="{E702F607-B4C3-D444-BE0B-5EEC385A3C8F}"/>
-                </a:ext>
-              </a:extLst>
-            </p:cNvPr>
-            <p:cNvCxnSpPr/>
-            <p:nvPr/>
-          </p:nvCxnSpPr>
-          <p:spPr>
-            <a:xfrm>
-              <a:off x="1404730" y="5380383"/>
-              <a:ext cx="3578087" cy="0"/>
-            </a:xfrm>
-            <a:prstGeom prst="straightConnector1">
-              <a:avLst/>
-            </a:prstGeom>
-            <a:ln w="76200">
-              <a:solidFill>
-                <a:srgbClr val="FF0000"/>
-              </a:solidFill>
-              <a:tailEnd type="triangle"/>
-            </a:ln>
-          </p:spPr>
-          <p:style>
-            <a:lnRef idx="1">
-              <a:schemeClr val="accent1"/>
-            </a:lnRef>
-            <a:fillRef idx="0">
-              <a:schemeClr val="accent1"/>
-            </a:fillRef>
-            <a:effectRef idx="0">
-              <a:schemeClr val="accent1"/>
-            </a:effectRef>
-            <a:fontRef idx="minor">
-              <a:schemeClr val="tx1"/>
-            </a:fontRef>
-          </p:style>
-        </p:cxnSp>
-        <p:cxnSp>
-          <p:nvCxnSpPr>
-            <p:cNvPr id="10" name="Straight Arrow Connector 9">
-              <a:extLst>
-                <a:ext uri="{FF2B5EF4-FFF2-40B4-BE49-F238E27FC236}">
-                  <a16:creationId xmlns:a16="http://schemas.microsoft.com/office/drawing/2014/main" id="{2B68AC1A-80D1-F44C-A9FD-2485AD60A79D}"/>
-                </a:ext>
-              </a:extLst>
-            </p:cNvPr>
-            <p:cNvCxnSpPr>
-              <a:cxnSpLocks/>
-            </p:cNvCxnSpPr>
-            <p:nvPr/>
-          </p:nvCxnSpPr>
-          <p:spPr>
-            <a:xfrm flipH="1" flipV="1">
-              <a:off x="4981472" y="2712720"/>
-              <a:ext cx="11385" cy="2502011"/>
-            </a:xfrm>
-            <a:prstGeom prst="straightConnector1">
-              <a:avLst/>
-            </a:prstGeom>
-            <a:ln w="76200">
-              <a:solidFill>
-                <a:srgbClr val="FF0000"/>
-              </a:solidFill>
-              <a:tailEnd type="triangle"/>
-            </a:ln>
-          </p:spPr>
-          <p:style>
-            <a:lnRef idx="1">
-              <a:schemeClr val="accent1"/>
-            </a:lnRef>
-            <a:fillRef idx="0">
-              <a:schemeClr val="accent1"/>
-            </a:fillRef>
-            <a:effectRef idx="0">
-              <a:schemeClr val="accent1"/>
-            </a:effectRef>
-            <a:fontRef idx="minor">
-              <a:schemeClr val="tx1"/>
-            </a:fontRef>
-          </p:style>
-        </p:cxnSp>
-        <p:cxnSp>
-          <p:nvCxnSpPr>
-            <p:cNvPr id="11" name="Straight Arrow Connector 10">
-              <a:extLst>
-                <a:ext uri="{FF2B5EF4-FFF2-40B4-BE49-F238E27FC236}">
-                  <a16:creationId xmlns:a16="http://schemas.microsoft.com/office/drawing/2014/main" id="{05F02A5E-ADD3-5748-BDDF-9AADE471B688}"/>
-                </a:ext>
-              </a:extLst>
-            </p:cNvPr>
-            <p:cNvCxnSpPr>
-              <a:cxnSpLocks/>
-            </p:cNvCxnSpPr>
-            <p:nvPr/>
-          </p:nvCxnSpPr>
-          <p:spPr>
-            <a:xfrm>
-              <a:off x="5135217" y="2712720"/>
-              <a:ext cx="0" cy="985520"/>
-            </a:xfrm>
-            <a:prstGeom prst="straightConnector1">
-              <a:avLst/>
-            </a:prstGeom>
-            <a:ln w="76200">
-              <a:solidFill>
-                <a:srgbClr val="FF0000"/>
-              </a:solidFill>
-              <a:tailEnd type="triangle"/>
-            </a:ln>
-          </p:spPr>
-          <p:style>
-            <a:lnRef idx="1">
-              <a:schemeClr val="accent1"/>
-            </a:lnRef>
-            <a:fillRef idx="0">
-              <a:schemeClr val="accent1"/>
-            </a:fillRef>
-            <a:effectRef idx="0">
-              <a:schemeClr val="accent1"/>
-            </a:effectRef>
-            <a:fontRef idx="minor">
-              <a:schemeClr val="tx1"/>
-            </a:fontRef>
-          </p:style>
-        </p:cxnSp>
-        <p:cxnSp>
-          <p:nvCxnSpPr>
-            <p:cNvPr id="13" name="Straight Arrow Connector 12">
-              <a:extLst>
-                <a:ext uri="{FF2B5EF4-FFF2-40B4-BE49-F238E27FC236}">
-                  <a16:creationId xmlns:a16="http://schemas.microsoft.com/office/drawing/2014/main" id="{ECEA78F0-50C0-EC4E-97B3-8C85B137FF34}"/>
-                </a:ext>
-              </a:extLst>
-            </p:cNvPr>
-            <p:cNvCxnSpPr>
-              <a:cxnSpLocks/>
-            </p:cNvCxnSpPr>
-            <p:nvPr/>
-          </p:nvCxnSpPr>
-          <p:spPr>
-            <a:xfrm>
-              <a:off x="5242560" y="3698240"/>
-              <a:ext cx="873760" cy="0"/>
-            </a:xfrm>
-            <a:prstGeom prst="straightConnector1">
-              <a:avLst/>
-            </a:prstGeom>
-            <a:ln w="76200">
-              <a:solidFill>
-                <a:srgbClr val="FF0000"/>
-              </a:solidFill>
-              <a:tailEnd type="triangle"/>
-            </a:ln>
-          </p:spPr>
-          <p:style>
-            <a:lnRef idx="1">
-              <a:schemeClr val="accent1"/>
-            </a:lnRef>
-            <a:fillRef idx="0">
-              <a:schemeClr val="accent1"/>
-            </a:fillRef>
-            <a:effectRef idx="0">
-              <a:schemeClr val="accent1"/>
-            </a:effectRef>
-            <a:fontRef idx="minor">
-              <a:schemeClr val="tx1"/>
-            </a:fontRef>
-          </p:style>
-        </p:cxnSp>
-        <p:sp>
-          <p:nvSpPr>
-            <p:cNvPr id="17" name="TextBox 16">
-              <a:extLst>
-                <a:ext uri="{FF2B5EF4-FFF2-40B4-BE49-F238E27FC236}">
-                  <a16:creationId xmlns:a16="http://schemas.microsoft.com/office/drawing/2014/main" id="{73E0A267-523F-314A-B0E1-C05B5BAD4F6F}"/>
-                </a:ext>
-              </a:extLst>
-            </p:cNvPr>
-            <p:cNvSpPr txBox="1"/>
-            <p:nvPr/>
-          </p:nvSpPr>
-          <p:spPr>
-            <a:xfrm rot="5400000">
-              <a:off x="4081972" y="5028396"/>
-              <a:ext cx="2252870" cy="453872"/>
-            </a:xfrm>
-            <a:prstGeom prst="rect">
-              <a:avLst/>
-            </a:prstGeom>
-            <a:noFill/>
-          </p:spPr>
-          <p:txBody>
-            <a:bodyPr wrap="square" rtlCol="0">
-              <a:spAutoFit/>
-            </a:bodyPr>
-            <a:lstStyle/>
-            <a:p>
-              <a:pPr algn="ctr"/>
-              <a:r>
-                <a:rPr lang="en-US" sz="1600" dirty="0">
-                  <a:highlight>
-                    <a:srgbClr val="FFFF00"/>
-                  </a:highlight>
-                </a:rPr>
-                <a:t>Align on a Line</a:t>
-              </a:r>
-            </a:p>
-          </p:txBody>
-        </p:sp>
-      </p:grpSp>
+          <a:prstGeom prst="rect">
+            <a:avLst/>
+          </a:prstGeom>
+        </p:spPr>
+      </p:pic>
+      <p:cxnSp>
+        <p:nvCxnSpPr>
+          <p:cNvPr id="9" name="Straight Arrow Connector 8">
+            <a:extLst>
+              <a:ext uri="{FF2B5EF4-FFF2-40B4-BE49-F238E27FC236}">
+                <a16:creationId xmlns:a16="http://schemas.microsoft.com/office/drawing/2014/main" id="{E702F607-B4C3-D444-BE0B-5EEC385A3C8F}"/>
+              </a:ext>
+            </a:extLst>
+          </p:cNvPr>
+          <p:cNvCxnSpPr>
+            <a:cxnSpLocks/>
+          </p:cNvCxnSpPr>
+          <p:nvPr/>
+        </p:nvCxnSpPr>
+        <p:spPr>
+          <a:xfrm>
+            <a:off x="4572000" y="5431902"/>
+            <a:ext cx="1761067" cy="0"/>
+          </a:xfrm>
+          <a:prstGeom prst="straightConnector1">
+            <a:avLst/>
+          </a:prstGeom>
+          <a:ln w="76200">
+            <a:solidFill>
+              <a:srgbClr val="FF0000"/>
+            </a:solidFill>
+            <a:tailEnd type="triangle"/>
+          </a:ln>
+        </p:spPr>
+        <p:style>
+          <a:lnRef idx="1">
+            <a:schemeClr val="accent1"/>
+          </a:lnRef>
+          <a:fillRef idx="0">
+            <a:schemeClr val="accent1"/>
+          </a:fillRef>
+          <a:effectRef idx="0">
+            <a:schemeClr val="accent1"/>
+          </a:effectRef>
+          <a:fontRef idx="minor">
+            <a:schemeClr val="tx1"/>
+          </a:fontRef>
+        </p:style>
+      </p:cxnSp>
+      <p:sp>
+        <p:nvSpPr>
+          <p:cNvPr id="17" name="TextBox 16">
+            <a:extLst>
+              <a:ext uri="{FF2B5EF4-FFF2-40B4-BE49-F238E27FC236}">
+                <a16:creationId xmlns:a16="http://schemas.microsoft.com/office/drawing/2014/main" id="{73E0A267-523F-314A-B0E1-C05B5BAD4F6F}"/>
+              </a:ext>
+            </a:extLst>
+          </p:cNvPr>
+          <p:cNvSpPr txBox="1"/>
+          <p:nvPr/>
+        </p:nvSpPr>
+        <p:spPr>
+          <a:xfrm rot="5400000">
+            <a:off x="5809651" y="5159232"/>
+            <a:ext cx="1448690" cy="291859"/>
+          </a:xfrm>
+          <a:prstGeom prst="rect">
+            <a:avLst/>
+          </a:prstGeom>
+          <a:noFill/>
+        </p:spPr>
+        <p:txBody>
+          <a:bodyPr wrap="square" rtlCol="0">
+            <a:spAutoFit/>
+          </a:bodyPr>
+          <a:lstStyle/>
+          <a:p>
+            <a:pPr algn="ctr"/>
+            <a:r>
+              <a:rPr lang="en-US" sz="1600" dirty="0">
+                <a:highlight>
+                  <a:srgbClr val="FFFF00"/>
+                </a:highlight>
+              </a:rPr>
+              <a:t>Align on a Line</a:t>
+            </a:r>
+          </a:p>
+        </p:txBody>
+      </p:sp>
       <p:sp>
         <p:nvSpPr>
           <p:cNvPr id="2" name="Title 1"/>
@@ -29597,7 +29394,7 @@
         <p:spPr>
           <a:xfrm>
             <a:off x="448091" y="1505583"/>
-            <a:ext cx="8238707" cy="4653479"/>
+            <a:ext cx="8247816" cy="4653479"/>
           </a:xfrm>
         </p:spPr>
         <p:txBody>
@@ -30847,6 +30644,76 @@
           <a:chExt cx="0" cy="0"/>
         </a:xfrm>
       </p:grpSpPr>
+      <p:pic>
+        <p:nvPicPr>
+          <p:cNvPr id="7" name="Picture 6" descr="A picture containing map&#10;&#10;Description automatically generated">
+            <a:extLst>
+              <a:ext uri="{FF2B5EF4-FFF2-40B4-BE49-F238E27FC236}">
+                <a16:creationId xmlns:a16="http://schemas.microsoft.com/office/drawing/2014/main" id="{B70D9F1C-D032-4453-CB56-6CF249E7C98E}"/>
+              </a:ext>
+            </a:extLst>
+          </p:cNvPr>
+          <p:cNvPicPr>
+            <a:picLocks noChangeAspect="1"/>
+          </p:cNvPicPr>
+          <p:nvPr/>
+        </p:nvPicPr>
+        <p:blipFill rotWithShape="1">
+          <a:blip r:embed="rId2">
+            <a:extLst>
+              <a:ext uri="{28A0092B-C50C-407E-A947-70E740481C1C}">
+                <a14:useLocalDpi xmlns:a14="http://schemas.microsoft.com/office/drawing/2010/main" val="0"/>
+              </a:ext>
+            </a:extLst>
+          </a:blip>
+          <a:srcRect l="19753" t="26446" r="35222"/>
+          <a:stretch/>
+        </p:blipFill>
+        <p:spPr>
+          <a:xfrm>
+            <a:off x="4884221" y="3559917"/>
+            <a:ext cx="3499555" cy="2766412"/>
+          </a:xfrm>
+          <a:prstGeom prst="rect">
+            <a:avLst/>
+          </a:prstGeom>
+        </p:spPr>
+      </p:pic>
+      <p:pic>
+        <p:nvPicPr>
+          <p:cNvPr id="6" name="Picture 5" descr="A picture containing map&#10;&#10;Description automatically generated">
+            <a:extLst>
+              <a:ext uri="{FF2B5EF4-FFF2-40B4-BE49-F238E27FC236}">
+                <a16:creationId xmlns:a16="http://schemas.microsoft.com/office/drawing/2014/main" id="{FEB96D54-E833-E965-44E2-EFFA7FC97D2C}"/>
+              </a:ext>
+            </a:extLst>
+          </p:cNvPr>
+          <p:cNvPicPr>
+            <a:picLocks noChangeAspect="1"/>
+          </p:cNvPicPr>
+          <p:nvPr/>
+        </p:nvPicPr>
+        <p:blipFill rotWithShape="1">
+          <a:blip r:embed="rId2">
+            <a:extLst>
+              <a:ext uri="{28A0092B-C50C-407E-A947-70E740481C1C}">
+                <a14:useLocalDpi xmlns:a14="http://schemas.microsoft.com/office/drawing/2010/main" val="0"/>
+              </a:ext>
+            </a:extLst>
+          </a:blip>
+          <a:srcRect l="19753" t="26446" r="35222"/>
+          <a:stretch/>
+        </p:blipFill>
+        <p:spPr>
+          <a:xfrm>
+            <a:off x="426965" y="3590252"/>
+            <a:ext cx="3499555" cy="2766412"/>
+          </a:xfrm>
+          <a:prstGeom prst="rect">
+            <a:avLst/>
+          </a:prstGeom>
+        </p:spPr>
+      </p:pic>
       <p:sp>
         <p:nvSpPr>
           <p:cNvPr id="2" name="Title 1"/>
@@ -31008,41 +30875,6 @@
           </a:fontRef>
         </p:style>
       </p:cxnSp>
-      <p:pic>
-        <p:nvPicPr>
-          <p:cNvPr id="19" name="Picture 18">
-            <a:extLst>
-              <a:ext uri="{FF2B5EF4-FFF2-40B4-BE49-F238E27FC236}">
-                <a16:creationId xmlns:a16="http://schemas.microsoft.com/office/drawing/2014/main" id="{11D62988-375B-0844-A62B-07699326B0D2}"/>
-              </a:ext>
-            </a:extLst>
-          </p:cNvPr>
-          <p:cNvPicPr>
-            <a:picLocks noChangeAspect="1"/>
-          </p:cNvPicPr>
-          <p:nvPr/>
-        </p:nvPicPr>
-        <p:blipFill rotWithShape="1">
-          <a:blip r:embed="rId2" cstate="screen">
-            <a:extLst>
-              <a:ext uri="{28A0092B-C50C-407E-A947-70E740481C1C}">
-                <a14:useLocalDpi xmlns:a14="http://schemas.microsoft.com/office/drawing/2010/main"/>
-              </a:ext>
-            </a:extLst>
-          </a:blip>
-          <a:srcRect/>
-          <a:stretch/>
-        </p:blipFill>
-        <p:spPr>
-          <a:xfrm>
-            <a:off x="581191" y="3623795"/>
-            <a:ext cx="3143315" cy="2662695"/>
-          </a:xfrm>
-          <a:prstGeom prst="rect">
-            <a:avLst/>
-          </a:prstGeom>
-        </p:spPr>
-      </p:pic>
       <p:cxnSp>
         <p:nvCxnSpPr>
           <p:cNvPr id="21" name="Straight Arrow Connector 20">
@@ -31059,7 +30891,7 @@
         </p:nvCxnSpPr>
         <p:spPr>
           <a:xfrm>
-            <a:off x="1261526" y="5472081"/>
+            <a:off x="674503" y="5408203"/>
             <a:ext cx="2039235" cy="0"/>
           </a:xfrm>
           <a:prstGeom prst="straightConnector1">
@@ -31101,7 +30933,7 @@
         </p:nvSpPr>
         <p:spPr>
           <a:xfrm>
-            <a:off x="1182030" y="5107479"/>
+            <a:off x="835476" y="5100869"/>
             <a:ext cx="1717288" cy="276999"/>
           </a:xfrm>
           <a:prstGeom prst="rect">
@@ -31127,41 +30959,6 @@
           </a:p>
         </p:txBody>
       </p:sp>
-      <p:pic>
-        <p:nvPicPr>
-          <p:cNvPr id="37" name="Picture 36">
-            <a:extLst>
-              <a:ext uri="{FF2B5EF4-FFF2-40B4-BE49-F238E27FC236}">
-                <a16:creationId xmlns:a16="http://schemas.microsoft.com/office/drawing/2014/main" id="{ADBB7C4A-8477-2844-8CF3-94411656AAB3}"/>
-              </a:ext>
-            </a:extLst>
-          </p:cNvPr>
-          <p:cNvPicPr>
-            <a:picLocks noChangeAspect="1"/>
-          </p:cNvPicPr>
-          <p:nvPr/>
-        </p:nvPicPr>
-        <p:blipFill rotWithShape="1">
-          <a:blip r:embed="rId2" cstate="screen">
-            <a:extLst>
-              <a:ext uri="{28A0092B-C50C-407E-A947-70E740481C1C}">
-                <a14:useLocalDpi xmlns:a14="http://schemas.microsoft.com/office/drawing/2010/main"/>
-              </a:ext>
-            </a:extLst>
-          </a:blip>
-          <a:srcRect/>
-          <a:stretch/>
-        </p:blipFill>
-        <p:spPr>
-          <a:xfrm>
-            <a:off x="4984513" y="3634625"/>
-            <a:ext cx="3143315" cy="2662695"/>
-          </a:xfrm>
-          <a:prstGeom prst="rect">
-            <a:avLst/>
-          </a:prstGeom>
-        </p:spPr>
-      </p:pic>
       <p:cxnSp>
         <p:nvCxnSpPr>
           <p:cNvPr id="38" name="Straight Arrow Connector 37">
@@ -31178,7 +30975,7 @@
         </p:nvCxnSpPr>
         <p:spPr>
           <a:xfrm flipV="1">
-            <a:off x="7337502" y="5482911"/>
+            <a:off x="6863368" y="5426260"/>
             <a:ext cx="366581" cy="18311"/>
           </a:xfrm>
           <a:prstGeom prst="straightConnector1">
@@ -31220,7 +31017,7 @@
         </p:nvSpPr>
         <p:spPr>
           <a:xfrm>
-            <a:off x="6678875" y="5131204"/>
+            <a:off x="6121141" y="5039214"/>
             <a:ext cx="1717288" cy="276999"/>
           </a:xfrm>
           <a:prstGeom prst="rect">
@@ -31262,7 +31059,7 @@
         </p:nvCxnSpPr>
         <p:spPr>
           <a:xfrm>
-            <a:off x="5451777" y="5501222"/>
+            <a:off x="4884221" y="5452577"/>
             <a:ext cx="1885725" cy="0"/>
           </a:xfrm>
           <a:prstGeom prst="straightConnector1">
@@ -31304,7 +31101,7 @@
         </p:nvSpPr>
         <p:spPr>
           <a:xfrm>
-            <a:off x="5139302" y="5131205"/>
+            <a:off x="4855016" y="5039214"/>
             <a:ext cx="1717288" cy="276999"/>
           </a:xfrm>
           <a:prstGeom prst="rect">
@@ -31809,7 +31606,7 @@
           <a:effectLst/>
           <a:extLst>
             <a:ext uri="{91240B29-F687-4f45-9708-019B960494DF}">
-              <a14:hiddenLine xmlns="" xmlns:a14="http://schemas.microsoft.com/office/drawing/2010/main" w="9525">
+              <a14:hiddenLine xmlns:a14="http://schemas.microsoft.com/office/drawing/2010/main" xmlns="" w="9525">
                 <a:solidFill>
                   <a:schemeClr val="tx1"/>
                 </a:solidFill>
@@ -31819,7 +31616,7 @@
               </a14:hiddenLine>
             </a:ext>
             <a:ext uri="{AF507438-7753-43e0-B8FC-AC1667EBCBE1}">
-              <a14:hiddenEffects xmlns="" xmlns:a14="http://schemas.microsoft.com/office/drawing/2010/main">
+              <a14:hiddenEffects xmlns:a14="http://schemas.microsoft.com/office/drawing/2010/main" xmlns="">
                 <a:effectLst>
                   <a:outerShdw dist="35921" dir="2700000" algn="ctr" rotWithShape="0">
                     <a:schemeClr val="bg2"/>
@@ -32160,7 +31957,7 @@
           <a:noFill/>
           <a:extLst>
             <a:ext uri="{909E8E84-426E-40dd-AFC4-6F175D3DCCD1}">
-              <a14:hiddenFill xmlns="" xmlns:a14="http://schemas.microsoft.com/office/drawing/2010/main">
+              <a14:hiddenFill xmlns:a14="http://schemas.microsoft.com/office/drawing/2010/main" xmlns="">
                 <a:solidFill>
                   <a:srgbClr val="FFFFFF"/>
                 </a:solidFill>

</xml_diff>